<commit_message>
Edits to Slide 37 and 54 (PMU definition)
</commit_message>
<xml_diff>
--- a/slides/KeyStone ARM A15 CorePac.pptx
+++ b/slides/KeyStone ARM A15 CorePac.pptx
@@ -327,7 +327,7 @@
               <a:pPr>
                 <a:defRPr/>
               </a:pPr>
-              <a:t>9/25/2013</a:t>
+              <a:t>11/12/2013</a:t>
             </a:fld>
             <a:endParaRPr lang="en-US" dirty="0"/>
           </a:p>
@@ -14268,85 +14268,6 @@
           <a:chExt cx="0" cy="0"/>
         </a:xfrm>
       </p:grpSpPr>
-      <p:sp>
-        <p:nvSpPr>
-          <p:cNvPr id="2" name="Title 1"/>
-          <p:cNvSpPr>
-            <a:spLocks noGrp="1"/>
-          </p:cNvSpPr>
-          <p:nvPr>
-            <p:ph type="title"/>
-          </p:nvPr>
-        </p:nvSpPr>
-        <p:spPr>
-          <a:xfrm>
-            <a:off x="457200" y="274638"/>
-            <a:ext cx="8229600" cy="715962"/>
-          </a:xfrm>
-        </p:spPr>
-        <p:txBody>
-          <a:bodyPr>
-            <a:normAutofit/>
-          </a:bodyPr>
-          <a:lstStyle/>
-          <a:p>
-            <a:r>
-              <a:rPr lang="en-US" sz="4000" dirty="0" smtClean="0"/>
-              <a:t>KeyStone II: IO Cache Coherency</a:t>
-            </a:r>
-            <a:endParaRPr lang="en-US" sz="4000" dirty="0"/>
-          </a:p>
-        </p:txBody>
-      </p:sp>
-      <p:sp>
-        <p:nvSpPr>
-          <p:cNvPr id="3" name="Content Placeholder 2"/>
-          <p:cNvSpPr>
-            <a:spLocks noGrp="1"/>
-          </p:cNvSpPr>
-          <p:nvPr>
-            <p:ph idx="1"/>
-          </p:nvPr>
-        </p:nvSpPr>
-        <p:spPr>
-          <a:xfrm>
-            <a:off x="381000" y="4443769"/>
-            <a:ext cx="8382000" cy="1645902"/>
-          </a:xfrm>
-        </p:spPr>
-        <p:txBody>
-          <a:bodyPr>
-            <a:normAutofit lnSpcReduction="10000"/>
-          </a:bodyPr>
-          <a:lstStyle/>
-          <a:p>
-            <a:r>
-              <a:rPr lang="en-US" sz="2400" dirty="0" smtClean="0"/>
-              <a:t>IO coherency for the ARM, SMP for the quad cluster:</a:t>
-            </a:r>
-          </a:p>
-          <a:p>
-            <a:pPr lvl="1"/>
-            <a:r>
-              <a:rPr lang="en-US" sz="2400" dirty="0" smtClean="0"/>
-              <a:t>DDR3A from 0x08_0000_0000 to 0x09_FFFF_FFFF (8 G)</a:t>
-            </a:r>
-          </a:p>
-          <a:p>
-            <a:pPr lvl="1"/>
-            <a:r>
-              <a:rPr lang="en-US" sz="2400" dirty="0" smtClean="0"/>
-              <a:t>MSMC SRAM</a:t>
-            </a:r>
-          </a:p>
-          <a:p>
-            <a:r>
-              <a:rPr lang="en-US" sz="2400" dirty="0" smtClean="0"/>
-              <a:t>Coherency for ease of use and performance</a:t>
-            </a:r>
-          </a:p>
-        </p:txBody>
-      </p:sp>
       <p:grpSp>
         <p:nvGrpSpPr>
           <p:cNvPr id="17" name="Group 16"/>
@@ -14789,6 +14710,85 @@
       </p:grpSp>
       <p:sp>
         <p:nvSpPr>
+          <p:cNvPr id="2" name="Title 1"/>
+          <p:cNvSpPr>
+            <a:spLocks noGrp="1"/>
+          </p:cNvSpPr>
+          <p:nvPr>
+            <p:ph type="title"/>
+          </p:nvPr>
+        </p:nvSpPr>
+        <p:spPr>
+          <a:xfrm>
+            <a:off x="457200" y="274638"/>
+            <a:ext cx="8229600" cy="715962"/>
+          </a:xfrm>
+        </p:spPr>
+        <p:txBody>
+          <a:bodyPr>
+            <a:normAutofit/>
+          </a:bodyPr>
+          <a:lstStyle/>
+          <a:p>
+            <a:r>
+              <a:rPr lang="en-US" sz="4000" dirty="0" smtClean="0"/>
+              <a:t>KeyStone II: IO Cache Coherency</a:t>
+            </a:r>
+            <a:endParaRPr lang="en-US" sz="4000" dirty="0"/>
+          </a:p>
+        </p:txBody>
+      </p:sp>
+      <p:sp>
+        <p:nvSpPr>
+          <p:cNvPr id="3" name="Content Placeholder 2"/>
+          <p:cNvSpPr>
+            <a:spLocks noGrp="1"/>
+          </p:cNvSpPr>
+          <p:nvPr>
+            <p:ph idx="1"/>
+          </p:nvPr>
+        </p:nvSpPr>
+        <p:spPr>
+          <a:xfrm>
+            <a:off x="381000" y="4443769"/>
+            <a:ext cx="8382000" cy="1645902"/>
+          </a:xfrm>
+        </p:spPr>
+        <p:txBody>
+          <a:bodyPr>
+            <a:normAutofit lnSpcReduction="10000"/>
+          </a:bodyPr>
+          <a:lstStyle/>
+          <a:p>
+            <a:r>
+              <a:rPr lang="en-US" sz="2400" dirty="0" smtClean="0"/>
+              <a:t>IO coherency for the ARM, SMP for the quad cluster:</a:t>
+            </a:r>
+          </a:p>
+          <a:p>
+            <a:pPr lvl="1"/>
+            <a:r>
+              <a:rPr lang="en-US" sz="2400" dirty="0" smtClean="0"/>
+              <a:t>DDR3A from 0x08_0000_0000 to 0x09_FFFF_FFFF (8 G)</a:t>
+            </a:r>
+          </a:p>
+          <a:p>
+            <a:pPr lvl="1"/>
+            <a:r>
+              <a:rPr lang="en-US" sz="2400" dirty="0" smtClean="0"/>
+              <a:t>MSMC SRAM</a:t>
+            </a:r>
+          </a:p>
+          <a:p>
+            <a:r>
+              <a:rPr lang="en-US" sz="2400" dirty="0" smtClean="0"/>
+              <a:t>Coherency for ease of use and performance</a:t>
+            </a:r>
+          </a:p>
+        </p:txBody>
+      </p:sp>
+      <p:sp>
+        <p:nvSpPr>
           <p:cNvPr id="19" name="Slide Number Placeholder 18"/>
           <p:cNvSpPr>
             <a:spLocks noGrp="1"/>
@@ -15456,7 +15456,7 @@
     </p:custDataLst>
     <p:extLst>
       <p:ext uri="{BB962C8B-B14F-4D97-AF65-F5344CB8AC3E}">
-        <p14:creationId xmlns:p14="http://schemas.microsoft.com/office/powerpoint/2010/main" xmlns="" val="3469200570"/>
+        <p14:creationId xmlns="" xmlns:p14="http://schemas.microsoft.com/office/powerpoint/2010/main" val="3469200570"/>
       </p:ext>
     </p:extLst>
   </p:cSld>
@@ -15908,7 +15908,7 @@
             <p:ph idx="1"/>
             <p:extLst>
               <p:ext uri="{D42A27DB-BD31-4B8C-83A1-F6EECF244321}">
-                <p14:modId xmlns="" xmlns:p14="http://schemas.microsoft.com/office/powerpoint/2010/main" val="1659503329"/>
+                <p14:modId xmlns:p14="http://schemas.microsoft.com/office/powerpoint/2010/main" xmlns="" val="1659503329"/>
               </p:ext>
             </p:extLst>
           </p:nvPr>
@@ -17802,7 +17802,7 @@
     </p:custDataLst>
     <p:extLst>
       <p:ext uri="{BB962C8B-B14F-4D97-AF65-F5344CB8AC3E}">
-        <p14:creationId xmlns:p14="http://schemas.microsoft.com/office/powerpoint/2010/main" xmlns="" val="3469200570"/>
+        <p14:creationId xmlns="" xmlns:p14="http://schemas.microsoft.com/office/powerpoint/2010/main" val="3469200570"/>
       </p:ext>
     </p:extLst>
   </p:cSld>
@@ -18337,7 +18337,23 @@
           <a:p>
             <a:r>
               <a:rPr lang="en-US" sz="2400" dirty="0" smtClean="0"/>
-              <a:t>PMU (Performance Monitoring Unit) is a set of counters that can gathers statistics various processor and memory events.</a:t>
+              <a:t>PMU (Performance Monitoring Unit) is a set of counters that </a:t>
+            </a:r>
+            <a:r>
+              <a:rPr lang="en-US" sz="2400" dirty="0" smtClean="0"/>
+              <a:t>gathers </a:t>
+            </a:r>
+            <a:r>
+              <a:rPr lang="en-US" sz="2400" dirty="0" smtClean="0"/>
+              <a:t>statistics </a:t>
+            </a:r>
+            <a:r>
+              <a:rPr lang="en-US" sz="2400" dirty="0" smtClean="0"/>
+              <a:t>from various </a:t>
+            </a:r>
+            <a:r>
+              <a:rPr lang="en-US" sz="2400" dirty="0" smtClean="0"/>
+              <a:t>processor and memory events.</a:t>
             </a:r>
           </a:p>
           <a:p>
@@ -22000,10 +22016,6 @@
 </file>
 
 <file path=customXml/item1.xml><?xml version="1.0" encoding="utf-8"?>
-<LongProperties xmlns="http://schemas.microsoft.com/office/2006/metadata/longProperties"/>
-</file>
-
-<file path=customXml/item2.xml><?xml version="1.0" encoding="utf-8"?>
 <ct:contentTypeSchema xmlns:ct="http://schemas.microsoft.com/office/2006/metadata/contentType" xmlns:ma="http://schemas.microsoft.com/office/2006/metadata/properties/metaAttributes" ct:_="" ma:_="" ma:contentTypeName="Document" ma:contentTypeID="0x0101006BF34EDD2AB14F49969AD5B68D65D28C" ma:contentTypeVersion="1" ma:contentTypeDescription="Create a new document." ma:contentTypeScope="" ma:versionID="aec3fda75a9471671297bbb4606d1d91">
   <xsd:schema xmlns:xsd="http://www.w3.org/2001/XMLSchema" xmlns:p="http://schemas.microsoft.com/office/2006/metadata/properties" xmlns:ns2="99c847d8-566e-43ce-87b7-3c417d164c47" targetNamespace="http://schemas.microsoft.com/office/2006/metadata/properties" ma:root="true" ma:fieldsID="6b49c4b1e87cfd71c9528e3cb8636bc2" ns2:_="">
     <xsd:import namespace="99c847d8-566e-43ce-87b7-3c417d164c47"/>
@@ -22065,6 +22077,14 @@
 </ct:contentTypeSchema>
 </file>
 
+<file path=customXml/item2.xml><?xml version="1.0" encoding="utf-8"?>
+<p:properties xmlns:p="http://schemas.microsoft.com/office/2006/metadata/properties" xmlns:xsi="http://www.w3.org/2001/XMLSchema-instance">
+  <documentManagement>
+    <Content_x0020_Owner xmlns="99c847d8-566e-43ce-87b7-3c417d164c47">Ramroop, Saffie</Content_x0020_Owner>
+  </documentManagement>
+</p:properties>
+</file>
+
 <file path=customXml/item3.xml><?xml version="1.0" encoding="utf-8"?>
 <?mso-contentType ?>
 <FormTemplates xmlns="http://schemas.microsoft.com/sharepoint/v3/contenttype/forms">
@@ -22075,22 +22095,10 @@
 </file>
 
 <file path=customXml/item4.xml><?xml version="1.0" encoding="utf-8"?>
-<p:properties xmlns:p="http://schemas.microsoft.com/office/2006/metadata/properties" xmlns:xsi="http://www.w3.org/2001/XMLSchema-instance">
-  <documentManagement>
-    <Content_x0020_Owner xmlns="99c847d8-566e-43ce-87b7-3c417d164c47">Ramroop, Saffie</Content_x0020_Owner>
-  </documentManagement>
-</p:properties>
+<LongProperties xmlns="http://schemas.microsoft.com/office/2006/metadata/longProperties"/>
 </file>
 
 <file path=customXml/itemProps1.xml><?xml version="1.0" encoding="utf-8"?>
-<ds:datastoreItem xmlns:ds="http://schemas.openxmlformats.org/officeDocument/2006/customXml" ds:itemID="{08087394-933C-48A1-8AD9-030539CA3EF7}">
-  <ds:schemaRefs>
-    <ds:schemaRef ds:uri="http://schemas.microsoft.com/office/2006/metadata/longProperties"/>
-  </ds:schemaRefs>
-</ds:datastoreItem>
-</file>
-
-<file path=customXml/itemProps2.xml><?xml version="1.0" encoding="utf-8"?>
 <ds:datastoreItem xmlns:ds="http://schemas.openxmlformats.org/officeDocument/2006/customXml" ds:itemID="{83529300-F1B4-4E63-A67B-9E50D1598C67}">
   <ds:schemaRefs>
     <ds:schemaRef ds:uri="http://schemas.microsoft.com/office/2006/metadata/contentType"/>
@@ -22107,6 +22115,15 @@
 </ds:datastoreItem>
 </file>
 
+<file path=customXml/itemProps2.xml><?xml version="1.0" encoding="utf-8"?>
+<ds:datastoreItem xmlns:ds="http://schemas.openxmlformats.org/officeDocument/2006/customXml" ds:itemID="{7CBBC1DF-22C6-4C0C-A1CC-096D390C1463}">
+  <ds:schemaRefs>
+    <ds:schemaRef ds:uri="http://schemas.microsoft.com/office/2006/metadata/properties"/>
+    <ds:schemaRef ds:uri="99c847d8-566e-43ce-87b7-3c417d164c47"/>
+  </ds:schemaRefs>
+</ds:datastoreItem>
+</file>
+
 <file path=customXml/itemProps3.xml><?xml version="1.0" encoding="utf-8"?>
 <ds:datastoreItem xmlns:ds="http://schemas.openxmlformats.org/officeDocument/2006/customXml" ds:itemID="{9247FEFF-82D0-4BBE-AA2E-6E8C28F7BBE5}">
   <ds:schemaRefs>
@@ -22116,10 +22133,9 @@
 </file>
 
 <file path=customXml/itemProps4.xml><?xml version="1.0" encoding="utf-8"?>
-<ds:datastoreItem xmlns:ds="http://schemas.openxmlformats.org/officeDocument/2006/customXml" ds:itemID="{7CBBC1DF-22C6-4C0C-A1CC-096D390C1463}">
+<ds:datastoreItem xmlns:ds="http://schemas.openxmlformats.org/officeDocument/2006/customXml" ds:itemID="{08087394-933C-48A1-8AD9-030539CA3EF7}">
   <ds:schemaRefs>
-    <ds:schemaRef ds:uri="http://schemas.microsoft.com/office/2006/metadata/properties"/>
-    <ds:schemaRef ds:uri="99c847d8-566e-43ce-87b7-3c417d164c47"/>
+    <ds:schemaRef ds:uri="http://schemas.microsoft.com/office/2006/metadata/longProperties"/>
   </ds:schemaRefs>
 </ds:datastoreItem>
 </file>
</xml_diff>

<commit_message>
Integrating with Loc version for Kymeta
</commit_message>
<xml_diff>
--- a/slides/KeyStone ARM A15 CorePac.pptx
+++ b/slides/KeyStone ARM A15 CorePac.pptx
@@ -324,7 +324,7 @@
               <a:pPr>
                 <a:defRPr/>
               </a:pPr>
-              <a:t>1/21/2014</a:t>
+              <a:t>3/31/2014</a:t>
             </a:fld>
             <a:endParaRPr lang="en-US" dirty="0"/>
           </a:p>
@@ -15285,7 +15285,7 @@
     </p:custDataLst>
     <p:extLst>
       <p:ext uri="{BB962C8B-B14F-4D97-AF65-F5344CB8AC3E}">
-        <p14:creationId xmlns="" xmlns:p14="http://schemas.microsoft.com/office/powerpoint/2010/main" val="3469200570"/>
+        <p14:creationId xmlns:p14="http://schemas.microsoft.com/office/powerpoint/2010/main" xmlns="" val="3469200570"/>
       </p:ext>
     </p:extLst>
   </p:cSld>
@@ -15603,7 +15603,7 @@
             <p:ph idx="1"/>
             <p:extLst>
               <p:ext uri="{D42A27DB-BD31-4B8C-83A1-F6EECF244321}">
-                <p14:modId xmlns:p14="http://schemas.microsoft.com/office/powerpoint/2010/main" xmlns="" val="1659503329"/>
+                <p14:modId xmlns="" xmlns:p14="http://schemas.microsoft.com/office/powerpoint/2010/main" val="1659503329"/>
               </p:ext>
             </p:extLst>
           </p:nvPr>
@@ -17573,7 +17573,7 @@
     </p:custDataLst>
     <p:extLst>
       <p:ext uri="{BB962C8B-B14F-4D97-AF65-F5344CB8AC3E}">
-        <p14:creationId xmlns="" xmlns:p14="http://schemas.microsoft.com/office/powerpoint/2010/main" val="3469200570"/>
+        <p14:creationId xmlns:p14="http://schemas.microsoft.com/office/powerpoint/2010/main" xmlns="" val="3469200570"/>
       </p:ext>
     </p:extLst>
   </p:cSld>
@@ -19721,7 +19721,19 @@
             <a:pPr lvl="1"/>
             <a:r>
               <a:rPr lang="en-US" sz="2400" dirty="0" smtClean="0"/>
-              <a:t>3 concurrent dispatched, up to 8 concurrent issues</a:t>
+              <a:t>3 </a:t>
+            </a:r>
+            <a:r>
+              <a:rPr lang="en-US" sz="2400" smtClean="0"/>
+              <a:t>concurrent </a:t>
+            </a:r>
+            <a:r>
+              <a:rPr lang="en-US" sz="2400" smtClean="0"/>
+              <a:t>decoded, </a:t>
+            </a:r>
+            <a:r>
+              <a:rPr lang="en-US" sz="2400" dirty="0" smtClean="0"/>
+              <a:t>up to 8 concurrent issues</a:t>
             </a:r>
           </a:p>
           <a:p>
@@ -21235,6 +21247,27 @@
 </file>
 
 <file path=customXml/item1.xml><?xml version="1.0" encoding="utf-8"?>
+<p:properties xmlns:p="http://schemas.microsoft.com/office/2006/metadata/properties" xmlns:xsi="http://www.w3.org/2001/XMLSchema-instance">
+  <documentManagement>
+    <Content_x0020_Owner xmlns="99c847d8-566e-43ce-87b7-3c417d164c47">Ramroop, Saffie</Content_x0020_Owner>
+  </documentManagement>
+</p:properties>
+</file>
+
+<file path=customXml/item2.xml><?xml version="1.0" encoding="utf-8"?>
+<LongProperties xmlns="http://schemas.microsoft.com/office/2006/metadata/longProperties"/>
+</file>
+
+<file path=customXml/item3.xml><?xml version="1.0" encoding="utf-8"?>
+<?mso-contentType ?>
+<FormTemplates xmlns="http://schemas.microsoft.com/sharepoint/v3/contenttype/forms">
+  <Display>DocumentLibraryForm</Display>
+  <Edit>DocumentLibraryForm</Edit>
+  <New>DocumentLibraryForm</New>
+</FormTemplates>
+</file>
+
+<file path=customXml/item4.xml><?xml version="1.0" encoding="utf-8"?>
 <ct:contentTypeSchema xmlns:ct="http://schemas.microsoft.com/office/2006/metadata/contentType" xmlns:ma="http://schemas.microsoft.com/office/2006/metadata/properties/metaAttributes" ct:_="" ma:_="" ma:contentTypeName="Document" ma:contentTypeID="0x0101006BF34EDD2AB14F49969AD5B68D65D28C" ma:contentTypeVersion="1" ma:contentTypeDescription="Create a new document." ma:contentTypeScope="" ma:versionID="aec3fda75a9471671297bbb4606d1d91">
   <xsd:schema xmlns:xsd="http://www.w3.org/2001/XMLSchema" xmlns:p="http://schemas.microsoft.com/office/2006/metadata/properties" xmlns:ns2="99c847d8-566e-43ce-87b7-3c417d164c47" targetNamespace="http://schemas.microsoft.com/office/2006/metadata/properties" ma:root="true" ma:fieldsID="6b49c4b1e87cfd71c9528e3cb8636bc2" ns2:_="">
     <xsd:import namespace="99c847d8-566e-43ce-87b7-3c417d164c47"/>
@@ -21296,28 +21329,32 @@
 </ct:contentTypeSchema>
 </file>
 
-<file path=customXml/item2.xml><?xml version="1.0" encoding="utf-8"?>
-<p:properties xmlns:p="http://schemas.microsoft.com/office/2006/metadata/properties" xmlns:xsi="http://www.w3.org/2001/XMLSchema-instance">
-  <documentManagement>
-    <Content_x0020_Owner xmlns="99c847d8-566e-43ce-87b7-3c417d164c47">Ramroop, Saffie</Content_x0020_Owner>
-  </documentManagement>
-</p:properties>
+<file path=customXml/itemProps1.xml><?xml version="1.0" encoding="utf-8"?>
+<ds:datastoreItem xmlns:ds="http://schemas.openxmlformats.org/officeDocument/2006/customXml" ds:itemID="{7CBBC1DF-22C6-4C0C-A1CC-096D390C1463}">
+  <ds:schemaRefs>
+    <ds:schemaRef ds:uri="http://schemas.microsoft.com/office/2006/metadata/properties"/>
+    <ds:schemaRef ds:uri="99c847d8-566e-43ce-87b7-3c417d164c47"/>
+  </ds:schemaRefs>
+</ds:datastoreItem>
 </file>
 
-<file path=customXml/item3.xml><?xml version="1.0" encoding="utf-8"?>
-<?mso-contentType ?>
-<FormTemplates xmlns="http://schemas.microsoft.com/sharepoint/v3/contenttype/forms">
-  <Display>DocumentLibraryForm</Display>
-  <Edit>DocumentLibraryForm</Edit>
-  <New>DocumentLibraryForm</New>
-</FormTemplates>
+<file path=customXml/itemProps2.xml><?xml version="1.0" encoding="utf-8"?>
+<ds:datastoreItem xmlns:ds="http://schemas.openxmlformats.org/officeDocument/2006/customXml" ds:itemID="{08087394-933C-48A1-8AD9-030539CA3EF7}">
+  <ds:schemaRefs>
+    <ds:schemaRef ds:uri="http://schemas.microsoft.com/office/2006/metadata/longProperties"/>
+  </ds:schemaRefs>
+</ds:datastoreItem>
 </file>
 
-<file path=customXml/item4.xml><?xml version="1.0" encoding="utf-8"?>
-<LongProperties xmlns="http://schemas.microsoft.com/office/2006/metadata/longProperties"/>
+<file path=customXml/itemProps3.xml><?xml version="1.0" encoding="utf-8"?>
+<ds:datastoreItem xmlns:ds="http://schemas.openxmlformats.org/officeDocument/2006/customXml" ds:itemID="{9247FEFF-82D0-4BBE-AA2E-6E8C28F7BBE5}">
+  <ds:schemaRefs>
+    <ds:schemaRef ds:uri="http://schemas.microsoft.com/sharepoint/v3/contenttype/forms"/>
+  </ds:schemaRefs>
+</ds:datastoreItem>
 </file>
 
-<file path=customXml/itemProps1.xml><?xml version="1.0" encoding="utf-8"?>
+<file path=customXml/itemProps4.xml><?xml version="1.0" encoding="utf-8"?>
 <ds:datastoreItem xmlns:ds="http://schemas.openxmlformats.org/officeDocument/2006/customXml" ds:itemID="{83529300-F1B4-4E63-A67B-9E50D1598C67}">
   <ds:schemaRefs>
     <ds:schemaRef ds:uri="http://schemas.microsoft.com/office/2006/metadata/contentType"/>
@@ -21332,29 +21369,4 @@
     <ds:schemaRef ds:uri="http://schemas.microsoft.com/office/internal/2005/internalDocumentation"/>
   </ds:schemaRefs>
 </ds:datastoreItem>
-</file>
-
-<file path=customXml/itemProps2.xml><?xml version="1.0" encoding="utf-8"?>
-<ds:datastoreItem xmlns:ds="http://schemas.openxmlformats.org/officeDocument/2006/customXml" ds:itemID="{7CBBC1DF-22C6-4C0C-A1CC-096D390C1463}">
-  <ds:schemaRefs>
-    <ds:schemaRef ds:uri="http://schemas.microsoft.com/office/2006/metadata/properties"/>
-    <ds:schemaRef ds:uri="99c847d8-566e-43ce-87b7-3c417d164c47"/>
-  </ds:schemaRefs>
-</ds:datastoreItem>
-</file>
-
-<file path=customXml/itemProps3.xml><?xml version="1.0" encoding="utf-8"?>
-<ds:datastoreItem xmlns:ds="http://schemas.openxmlformats.org/officeDocument/2006/customXml" ds:itemID="{9247FEFF-82D0-4BBE-AA2E-6E8C28F7BBE5}">
-  <ds:schemaRefs>
-    <ds:schemaRef ds:uri="http://schemas.microsoft.com/sharepoint/v3/contenttype/forms"/>
-  </ds:schemaRefs>
-</ds:datastoreItem>
-</file>
-
-<file path=customXml/itemProps4.xml><?xml version="1.0" encoding="utf-8"?>
-<ds:datastoreItem xmlns:ds="http://schemas.openxmlformats.org/officeDocument/2006/customXml" ds:itemID="{08087394-933C-48A1-8AD9-030539CA3EF7}">
-  <ds:schemaRefs>
-    <ds:schemaRef ds:uri="http://schemas.microsoft.com/office/2006/metadata/longProperties"/>
-  </ds:schemaRefs>
-</ds:datastoreItem>
 </file>
</xml_diff>